<commit_message>
modified:   DSAsgn5Final/DS1-DesignContent.doc 	modified:   DSAsgn5Final/DSAsgmtPpt.pptx 	modified:   DSAsgn5Final/binaryHeap.h 	modified:   DSAsgn5Final/constants.h 	modified:   DSAsgn5Final/divertedFlightsList.txt 	modified:   DSAsgn5Final/servicedFlightsList.txt 	modified:   DSAsgn5Final/stacktype.h
</commit_message>
<xml_diff>
--- a/DSAsgn5Final/DSAsgmtPpt.pptx
+++ b/DSAsgn5Final/DSAsgmtPpt.pptx
@@ -293,7 +293,7 @@
       </p15:sldGuideLst>
     </p:ext>
     <p:ext uri="GoogleSlidesCustomDataVersion2">
-      <go:slidesCustomData xmlns:go="http://customooxmlschemas.google.com/" xmlns:ahyp="http://schemas.microsoft.com/office/drawing/2018/hyperlinkcolor" xmlns:p15="http://schemas.microsoft.com/office/powerpoint/2012/main" xmlns:p14="http://schemas.microsoft.com/office/powerpoint/2010/main" xmlns:com="http://schemas.openxmlformats.org/drawingml/2006/compatibility" xmlns:pvml="urn:schemas-microsoft-com:office:powerpoint" xmlns:v="urn:schemas-microsoft-com:vml" xmlns:o="urn:schemas-microsoft-com:office:office" xmlns:dgm="http://schemas.openxmlformats.org/drawingml/2006/diagram" xmlns:c="http://schemas.openxmlformats.org/drawingml/2006/chart" xmlns:mv="urn:schemas-microsoft-com:mac:vml" xmlns:mc="http://schemas.openxmlformats.org/markup-compatibility/2006" xmlns="" r:id="rId50" roundtripDataSignature="AMtx7mjB6zdn8UoV8N3CN5EyPwv/ZXW10g=="/>
+      <go:slidesCustomData xmlns="" xmlns:mc="http://schemas.openxmlformats.org/markup-compatibility/2006" xmlns:mv="urn:schemas-microsoft-com:mac:vml" xmlns:c="http://schemas.openxmlformats.org/drawingml/2006/chart" xmlns:dgm="http://schemas.openxmlformats.org/drawingml/2006/diagram" xmlns:o="urn:schemas-microsoft-com:office:office" xmlns:v="urn:schemas-microsoft-com:vml" xmlns:pvml="urn:schemas-microsoft-com:office:powerpoint" xmlns:com="http://schemas.openxmlformats.org/drawingml/2006/compatibility" xmlns:p14="http://schemas.microsoft.com/office/powerpoint/2010/main" xmlns:p15="http://schemas.microsoft.com/office/powerpoint/2012/main" xmlns:ahyp="http://schemas.microsoft.com/office/drawing/2018/hyperlinkcolor" xmlns:go="http://customooxmlschemas.google.com/" r:id="rId50" roundtripDataSignature="AMtx7mjB6zdn8UoV8N3CN5EyPwv/ZXW10g=="/>
     </p:ext>
   </p:extLst>
 </p:presentation>
@@ -9803,18 +9803,16 @@
                 <a:ea typeface="Calibri" panose="020F0502020204030204" pitchFamily="34" charset="0"/>
                 <a:cs typeface="Times New Roman" panose="02020603050405020304" pitchFamily="18" charset="0"/>
               </a:rPr>
-              <a:t>The order of this build heap is linear i.e. O (N).  </a:t>
-            </a:r>
-          </a:p>
-          <a:p>
-            <a:pPr lvl="1" algn="just">
-              <a:lnSpc>
-                <a:spcPct val="100000"/>
-              </a:lnSpc>
-              <a:spcAft>
-                <a:spcPts val="1000"/>
-              </a:spcAft>
-            </a:pPr>
+              <a:t>The order of this build heap is that of  Heap binary tre</a:t>
+            </a:r>
+            <a:r>
+              <a:rPr lang="en-US" dirty="0">
+                <a:latin typeface="Times New Roman" panose="02020603050405020304" pitchFamily="18" charset="0"/>
+                <a:ea typeface="Calibri" panose="020F0502020204030204" pitchFamily="34" charset="0"/>
+                <a:cs typeface="Times New Roman" panose="02020603050405020304" pitchFamily="18" charset="0"/>
+              </a:rPr>
+              <a:t>e insertion </a:t>
+            </a:r>
             <a:r>
               <a:rPr lang="en-US" dirty="0">
                 <a:effectLst/>
@@ -9822,7 +9820,69 @@
                 <a:ea typeface="Calibri" panose="020F0502020204030204" pitchFamily="34" charset="0"/>
                 <a:cs typeface="Times New Roman" panose="02020603050405020304" pitchFamily="18" charset="0"/>
               </a:rPr>
-              <a:t>There after there would be an insert operation for every new arrival as it involves adding another departure event for the new arrival.</a:t>
+              <a:t>i.e. O (</a:t>
+            </a:r>
+            <a:r>
+              <a:rPr lang="en-US" dirty="0">
+                <a:latin typeface="Times New Roman" panose="02020603050405020304" pitchFamily="18" charset="0"/>
+                <a:ea typeface="Calibri" panose="020F0502020204030204" pitchFamily="34" charset="0"/>
+                <a:cs typeface="Times New Roman" panose="02020603050405020304" pitchFamily="18" charset="0"/>
+              </a:rPr>
+              <a:t>N l</a:t>
+            </a:r>
+            <a:r>
+              <a:rPr lang="en-US" dirty="0">
+                <a:effectLst/>
+                <a:latin typeface="Times New Roman" panose="02020603050405020304" pitchFamily="18" charset="0"/>
+                <a:ea typeface="Calibri" panose="020F0502020204030204" pitchFamily="34" charset="0"/>
+                <a:cs typeface="Times New Roman" panose="02020603050405020304" pitchFamily="18" charset="0"/>
+              </a:rPr>
+              <a:t>og N</a:t>
+            </a:r>
+            <a:r>
+              <a:rPr lang="en-US" dirty="0">
+                <a:latin typeface="Times New Roman" panose="02020603050405020304" pitchFamily="18" charset="0"/>
+                <a:ea typeface="Calibri" panose="020F0502020204030204" pitchFamily="34" charset="0"/>
+                <a:cs typeface="Times New Roman" panose="02020603050405020304" pitchFamily="18" charset="0"/>
+              </a:rPr>
+              <a:t> </a:t>
+            </a:r>
+            <a:r>
+              <a:rPr lang="en-US" dirty="0">
+                <a:effectLst/>
+                <a:latin typeface="Times New Roman" panose="02020603050405020304" pitchFamily="18" charset="0"/>
+                <a:ea typeface="Calibri" panose="020F0502020204030204" pitchFamily="34" charset="0"/>
+                <a:cs typeface="Times New Roman" panose="02020603050405020304" pitchFamily="18" charset="0"/>
+              </a:rPr>
+              <a:t>).  </a:t>
+            </a:r>
+          </a:p>
+          <a:p>
+            <a:pPr lvl="1" algn="just">
+              <a:lnSpc>
+                <a:spcPct val="100000"/>
+              </a:lnSpc>
+              <a:spcAft>
+                <a:spcPts val="1000"/>
+              </a:spcAft>
+            </a:pPr>
+            <a:r>
+              <a:rPr lang="en-US" dirty="0">
+                <a:effectLst/>
+                <a:latin typeface="Times New Roman" panose="02020603050405020304" pitchFamily="18" charset="0"/>
+                <a:ea typeface="Calibri" panose="020F0502020204030204" pitchFamily="34" charset="0"/>
+                <a:cs typeface="Times New Roman" panose="02020603050405020304" pitchFamily="18" charset="0"/>
+              </a:rPr>
+              <a:t>There after there would be an insert operation only for every new arrival as it involves adding another departure event for the new arrival so </a:t>
+            </a:r>
+            <a:r>
+              <a:rPr lang="en-US">
+                <a:effectLst/>
+                <a:latin typeface="Times New Roman" panose="02020603050405020304" pitchFamily="18" charset="0"/>
+                <a:ea typeface="Calibri" panose="020F0502020204030204" pitchFamily="34" charset="0"/>
+                <a:cs typeface="Times New Roman" panose="02020603050405020304" pitchFamily="18" charset="0"/>
+              </a:rPr>
+              <a:t>that would be O(log N)</a:t>
             </a:r>
             <a:endParaRPr lang="en-IN" dirty="0">
               <a:effectLst/>
@@ -10513,7 +10573,7 @@
           </a:bodyPr>
           <a:lstStyle/>
           <a:p>
-            <a:pPr marL="114300" indent="0" algn="just">
+            <a:pPr marL="114300" indent="0" algn="ctr">
               <a:buNone/>
             </a:pPr>
             <a:r>
@@ -10521,7 +10581,7 @@
                 <a:latin typeface="Times New Roman" panose="02020603050405020304" pitchFamily="18" charset="0"/>
                 <a:cs typeface="Times New Roman" panose="02020603050405020304" pitchFamily="18" charset="0"/>
               </a:rPr>
-              <a:t>Demonstrate application of a Priority queue </a:t>
+              <a:t>Demonstrate an application of a Priority queue </a:t>
             </a:r>
             <a:r>
               <a:rPr lang="en-IN" sz="2800" dirty="0" err="1">

</xml_diff>

<commit_message>
modified:   DSAsgn5Final/DS1Asgmt.cpp 	modified:   DSAsgn5Final/DSAsgmtPpt.pptx 	modified:   DSAsgn5Final/binaryHeap.h 	modified:   DSAsgn5Final/constants.h 	modified:   DSAsgn5Final/stacktype.h
</commit_message>
<xml_diff>
--- a/DSAsgn5Final/DSAsgmtPpt.pptx
+++ b/DSAsgn5Final/DSAsgmtPpt.pptx
@@ -5,7 +5,7 @@
     <p:sldMasterId id="2147483648" r:id="rId1"/>
   </p:sldMasterIdLst>
   <p:notesMasterIdLst>
-    <p:notesMasterId r:id="rId18"/>
+    <p:notesMasterId r:id="rId19"/>
   </p:notesMasterIdLst>
   <p:sldIdLst>
     <p:sldId id="256" r:id="rId2"/>
@@ -21,31 +21,32 @@
     <p:sldId id="295" r:id="rId12"/>
     <p:sldId id="294" r:id="rId13"/>
     <p:sldId id="262" r:id="rId14"/>
-    <p:sldId id="296" r:id="rId15"/>
-    <p:sldId id="297" r:id="rId16"/>
-    <p:sldId id="288" r:id="rId17"/>
+    <p:sldId id="298" r:id="rId15"/>
+    <p:sldId id="296" r:id="rId16"/>
+    <p:sldId id="297" r:id="rId17"/>
+    <p:sldId id="288" r:id="rId18"/>
   </p:sldIdLst>
   <p:sldSz cx="9144000" cy="5143500" type="screen16x9"/>
   <p:notesSz cx="6858000" cy="9144000"/>
   <p:embeddedFontLst>
     <p:embeddedFont>
       <p:font typeface="Calibri" panose="020F0502020204030204" pitchFamily="34" charset="0"/>
-      <p:regular r:id="rId19"/>
-      <p:bold r:id="rId20"/>
-      <p:italic r:id="rId21"/>
-      <p:boldItalic r:id="rId22"/>
+      <p:regular r:id="rId20"/>
+      <p:bold r:id="rId21"/>
+      <p:italic r:id="rId22"/>
+      <p:boldItalic r:id="rId23"/>
     </p:embeddedFont>
     <p:embeddedFont>
       <p:font typeface="Open Sans" panose="020B0606030504020204" pitchFamily="34" charset="0"/>
-      <p:regular r:id="rId23"/>
-      <p:bold r:id="rId24"/>
-      <p:italic r:id="rId25"/>
-      <p:boldItalic r:id="rId26"/>
+      <p:regular r:id="rId24"/>
+      <p:bold r:id="rId25"/>
+      <p:italic r:id="rId26"/>
+      <p:boldItalic r:id="rId27"/>
     </p:embeddedFont>
     <p:embeddedFont>
       <p:font typeface="PT Sans Narrow" panose="020B0506020203020204" pitchFamily="34" charset="0"/>
-      <p:regular r:id="rId27"/>
-      <p:bold r:id="rId28"/>
+      <p:regular r:id="rId28"/>
+      <p:bold r:id="rId29"/>
     </p:embeddedFont>
   </p:embeddedFontLst>
   <p:defaultTextStyle>
@@ -293,7 +294,7 @@
       </p15:sldGuideLst>
     </p:ext>
     <p:ext uri="GoogleSlidesCustomDataVersion2">
-      <go:slidesCustomData xmlns="" xmlns:mc="http://schemas.openxmlformats.org/markup-compatibility/2006" xmlns:mv="urn:schemas-microsoft-com:mac:vml" xmlns:c="http://schemas.openxmlformats.org/drawingml/2006/chart" xmlns:dgm="http://schemas.openxmlformats.org/drawingml/2006/diagram" xmlns:o="urn:schemas-microsoft-com:office:office" xmlns:v="urn:schemas-microsoft-com:vml" xmlns:pvml="urn:schemas-microsoft-com:office:powerpoint" xmlns:com="http://schemas.openxmlformats.org/drawingml/2006/compatibility" xmlns:p14="http://schemas.microsoft.com/office/powerpoint/2010/main" xmlns:p15="http://schemas.microsoft.com/office/powerpoint/2012/main" xmlns:ahyp="http://schemas.microsoft.com/office/drawing/2018/hyperlinkcolor" xmlns:go="http://customooxmlschemas.google.com/" r:id="rId50" roundtripDataSignature="AMtx7mjB6zdn8UoV8N3CN5EyPwv/ZXW10g=="/>
+      <go:slidesCustomData xmlns:go="http://customooxmlschemas.google.com/" xmlns:ahyp="http://schemas.microsoft.com/office/drawing/2018/hyperlinkcolor" xmlns:p15="http://schemas.microsoft.com/office/powerpoint/2012/main" xmlns:p14="http://schemas.microsoft.com/office/powerpoint/2010/main" xmlns:com="http://schemas.openxmlformats.org/drawingml/2006/compatibility" xmlns:pvml="urn:schemas-microsoft-com:office:powerpoint" xmlns:v="urn:schemas-microsoft-com:vml" xmlns:o="urn:schemas-microsoft-com:office:office" xmlns:dgm="http://schemas.openxmlformats.org/drawingml/2006/diagram" xmlns:c="http://schemas.openxmlformats.org/drawingml/2006/chart" xmlns:mv="urn:schemas-microsoft-com:mac:vml" xmlns:mc="http://schemas.openxmlformats.org/markup-compatibility/2006" xmlns="" r:id="rId50" roundtripDataSignature="AMtx7mjB6zdn8UoV8N3CN5EyPwv/ZXW10g=="/>
     </p:ext>
   </p:extLst>
 </p:presentation>
@@ -9265,16 +9266,15 @@
                 <a:ea typeface="Calibri" panose="020F0502020204030204" pitchFamily="34" charset="0"/>
                 <a:cs typeface="Times New Roman" panose="02020603050405020304" pitchFamily="18" charset="0"/>
               </a:rPr>
-              <a:t>If gate number available store the Event r in the </a:t>
-            </a:r>
-            <a:r>
-              <a:rPr lang="en-US" dirty="0" err="1">
-                <a:effectLst/>
+              <a:t>If gate number available store the Event record </a:t>
+            </a:r>
+            <a:r>
+              <a:rPr lang="en-US" sz="1400" dirty="0">
                 <a:latin typeface="Times New Roman" panose="02020603050405020304" pitchFamily="18" charset="0"/>
                 <a:ea typeface="Calibri" panose="020F0502020204030204" pitchFamily="34" charset="0"/>
                 <a:cs typeface="Times New Roman" panose="02020603050405020304" pitchFamily="18" charset="0"/>
               </a:rPr>
-              <a:t>scheduleds</a:t>
+              <a:t>in the scheduled serviced flights vector </a:t>
             </a:r>
             <a:r>
               <a:rPr lang="en-US" dirty="0">
@@ -9283,16 +9283,16 @@
                 <a:ea typeface="Calibri" panose="020F0502020204030204" pitchFamily="34" charset="0"/>
                 <a:cs typeface="Times New Roman" panose="02020603050405020304" pitchFamily="18" charset="0"/>
               </a:rPr>
-              <a:t> vector as an  arrival event </a:t>
-            </a:r>
-          </a:p>
-          <a:p>
-            <a:pPr marL="1657350" lvl="1" indent="-285750">
+              <a:t>as an  arrival event </a:t>
+            </a:r>
+          </a:p>
+          <a:p>
+            <a:pPr marL="2114550" lvl="2" indent="-285750">
               <a:spcAft>
                 <a:spcPts val="1000"/>
               </a:spcAft>
-              <a:buFont typeface="Wingdings" panose="05000000000000000000" pitchFamily="2" charset="2"/>
-              <a:buChar char="§"/>
+              <a:buFont typeface="Courier New" panose="02070309020205020404" pitchFamily="49" charset="0"/>
+              <a:buChar char="o"/>
             </a:pPr>
             <a:r>
               <a:rPr lang="en-US" dirty="0">
@@ -9627,7 +9627,7 @@
   <p:cSld>
     <p:spTree>
       <p:nvGrpSpPr>
-        <p:cNvPr id="1" name="Shape 95"/>
+        <p:cNvPr id="1" name=""/>
         <p:cNvGrpSpPr/>
         <p:nvPr/>
       </p:nvGrpSpPr>
@@ -9639,434 +9639,10 @@
           <a:chExt cx="0" cy="0"/>
         </a:xfrm>
       </p:grpSpPr>
-      <p:sp>
-        <p:nvSpPr>
-          <p:cNvPr id="96" name="Google Shape;96;g29a6ab1d9b3_0_49"/>
-          <p:cNvSpPr txBox="1">
-            <a:spLocks noGrp="1"/>
-          </p:cNvSpPr>
-          <p:nvPr>
-            <p:ph type="title"/>
-          </p:nvPr>
-        </p:nvSpPr>
-        <p:spPr>
-          <a:xfrm>
-            <a:off x="438615" y="125000"/>
-            <a:ext cx="7914554" cy="707400"/>
-          </a:xfrm>
-          <a:prstGeom prst="rect">
-            <a:avLst/>
-          </a:prstGeom>
-          <a:noFill/>
-          <a:ln>
-            <a:noFill/>
-          </a:ln>
-        </p:spPr>
-        <p:txBody>
-          <a:bodyPr spcFirstLastPara="1" wrap="square" lIns="91425" tIns="91425" rIns="91425" bIns="91425" anchor="t" anchorCtr="0">
-            <a:normAutofit/>
-          </a:bodyPr>
-          <a:lstStyle/>
-          <a:p>
-            <a:pPr marL="0" lvl="0" indent="0" rtl="0">
-              <a:lnSpc>
-                <a:spcPct val="100000"/>
-              </a:lnSpc>
-              <a:spcBef>
-                <a:spcPts val="0"/>
-              </a:spcBef>
-              <a:spcAft>
-                <a:spcPts val="0"/>
-              </a:spcAft>
-              <a:buSzPct val="219512"/>
-              <a:buNone/>
-            </a:pPr>
-            <a:r>
-              <a:rPr lang="en" sz="2400" dirty="0">
-                <a:latin typeface="Times New Roman" panose="02020603050405020304" pitchFamily="18" charset="0"/>
-                <a:cs typeface="Times New Roman" panose="02020603050405020304" pitchFamily="18" charset="0"/>
-              </a:rPr>
-              <a:t>   Program performance analysis</a:t>
-            </a:r>
-            <a:endParaRPr sz="2400" dirty="0">
-              <a:latin typeface="Times New Roman" panose="02020603050405020304" pitchFamily="18" charset="0"/>
-              <a:cs typeface="Times New Roman" panose="02020603050405020304" pitchFamily="18" charset="0"/>
-            </a:endParaRPr>
-          </a:p>
-        </p:txBody>
-      </p:sp>
-      <p:sp>
-        <p:nvSpPr>
-          <p:cNvPr id="97" name="Google Shape;97;g29a6ab1d9b3_0_49"/>
-          <p:cNvSpPr txBox="1">
-            <a:spLocks noGrp="1"/>
-          </p:cNvSpPr>
-          <p:nvPr>
-            <p:ph type="body" idx="1"/>
-          </p:nvPr>
-        </p:nvSpPr>
-        <p:spPr>
-          <a:xfrm>
-            <a:off x="125312" y="832400"/>
-            <a:ext cx="8520600" cy="3932888"/>
-          </a:xfrm>
-          <a:prstGeom prst="rect">
-            <a:avLst/>
-          </a:prstGeom>
-          <a:noFill/>
-          <a:ln>
-            <a:noFill/>
-          </a:ln>
-        </p:spPr>
-        <p:txBody>
-          <a:bodyPr spcFirstLastPara="1" wrap="square" lIns="91425" tIns="91425" rIns="91425" bIns="91425" anchor="t" anchorCtr="0">
-            <a:noAutofit/>
-          </a:bodyPr>
-          <a:lstStyle/>
-          <a:p>
-            <a:pPr algn="just">
-              <a:lnSpc>
-                <a:spcPct val="100000"/>
-              </a:lnSpc>
-              <a:spcAft>
-                <a:spcPts val="1000"/>
-              </a:spcAft>
-            </a:pPr>
-            <a:r>
-              <a:rPr lang="en-US" sz="1800" dirty="0">
-                <a:effectLst/>
-                <a:latin typeface="Times New Roman" panose="02020603050405020304" pitchFamily="18" charset="0"/>
-                <a:ea typeface="Calibri" panose="020F0502020204030204" pitchFamily="34" charset="0"/>
-                <a:cs typeface="Times New Roman" panose="02020603050405020304" pitchFamily="18" charset="0"/>
-              </a:rPr>
-              <a:t>The initial construction of heap-ordered tree object is done with N items (N arrivals) using the </a:t>
-            </a:r>
-            <a:r>
-              <a:rPr lang="en-US" sz="1800" b="1" dirty="0" err="1">
-                <a:effectLst/>
-                <a:latin typeface="Times New Roman" panose="02020603050405020304" pitchFamily="18" charset="0"/>
-                <a:ea typeface="Calibri" panose="020F0502020204030204" pitchFamily="34" charset="0"/>
-                <a:cs typeface="Times New Roman" panose="02020603050405020304" pitchFamily="18" charset="0"/>
-              </a:rPr>
-              <a:t>buildheap</a:t>
-            </a:r>
-            <a:r>
-              <a:rPr lang="en-US" sz="1800" b="1" dirty="0">
-                <a:effectLst/>
-                <a:latin typeface="Times New Roman" panose="02020603050405020304" pitchFamily="18" charset="0"/>
-                <a:ea typeface="Calibri" panose="020F0502020204030204" pitchFamily="34" charset="0"/>
-                <a:cs typeface="Times New Roman" panose="02020603050405020304" pitchFamily="18" charset="0"/>
-              </a:rPr>
-              <a:t> function call </a:t>
-            </a:r>
-            <a:r>
-              <a:rPr lang="en-US" sz="1800" dirty="0">
-                <a:effectLst/>
-                <a:latin typeface="Times New Roman" panose="02020603050405020304" pitchFamily="18" charset="0"/>
-                <a:ea typeface="Calibri" panose="020F0502020204030204" pitchFamily="34" charset="0"/>
-                <a:cs typeface="Times New Roman" panose="02020603050405020304" pitchFamily="18" charset="0"/>
-              </a:rPr>
-              <a:t>from within the parameter constructor of the </a:t>
-            </a:r>
-            <a:r>
-              <a:rPr lang="en-US" sz="1800" dirty="0" err="1">
-                <a:effectLst/>
-                <a:latin typeface="Times New Roman" panose="02020603050405020304" pitchFamily="18" charset="0"/>
-                <a:ea typeface="Calibri" panose="020F0502020204030204" pitchFamily="34" charset="0"/>
-                <a:cs typeface="Times New Roman" panose="02020603050405020304" pitchFamily="18" charset="0"/>
-              </a:rPr>
-              <a:t>Binaryheap</a:t>
-            </a:r>
-            <a:r>
-              <a:rPr lang="en-US" sz="1800" dirty="0">
-                <a:effectLst/>
-                <a:latin typeface="Times New Roman" panose="02020603050405020304" pitchFamily="18" charset="0"/>
-                <a:ea typeface="Calibri" panose="020F0502020204030204" pitchFamily="34" charset="0"/>
-                <a:cs typeface="Times New Roman" panose="02020603050405020304" pitchFamily="18" charset="0"/>
-              </a:rPr>
-              <a:t> class.</a:t>
-            </a:r>
-          </a:p>
-          <a:p>
-            <a:pPr lvl="1" algn="just">
-              <a:lnSpc>
-                <a:spcPct val="100000"/>
-              </a:lnSpc>
-              <a:spcAft>
-                <a:spcPts val="1000"/>
-              </a:spcAft>
-            </a:pPr>
-            <a:r>
-              <a:rPr lang="en-US" dirty="0">
-                <a:effectLst/>
-                <a:latin typeface="Times New Roman" panose="02020603050405020304" pitchFamily="18" charset="0"/>
-                <a:ea typeface="Calibri" panose="020F0502020204030204" pitchFamily="34" charset="0"/>
-                <a:cs typeface="Times New Roman" panose="02020603050405020304" pitchFamily="18" charset="0"/>
-              </a:rPr>
-              <a:t>The order of this build heap is that of  Heap binary tre</a:t>
-            </a:r>
-            <a:r>
-              <a:rPr lang="en-US" dirty="0">
-                <a:latin typeface="Times New Roman" panose="02020603050405020304" pitchFamily="18" charset="0"/>
-                <a:ea typeface="Calibri" panose="020F0502020204030204" pitchFamily="34" charset="0"/>
-                <a:cs typeface="Times New Roman" panose="02020603050405020304" pitchFamily="18" charset="0"/>
-              </a:rPr>
-              <a:t>e insertion </a:t>
-            </a:r>
-            <a:r>
-              <a:rPr lang="en-US" dirty="0">
-                <a:effectLst/>
-                <a:latin typeface="Times New Roman" panose="02020603050405020304" pitchFamily="18" charset="0"/>
-                <a:ea typeface="Calibri" panose="020F0502020204030204" pitchFamily="34" charset="0"/>
-                <a:cs typeface="Times New Roman" panose="02020603050405020304" pitchFamily="18" charset="0"/>
-              </a:rPr>
-              <a:t>i.e. O (</a:t>
-            </a:r>
-            <a:r>
-              <a:rPr lang="en-US" dirty="0">
-                <a:latin typeface="Times New Roman" panose="02020603050405020304" pitchFamily="18" charset="0"/>
-                <a:ea typeface="Calibri" panose="020F0502020204030204" pitchFamily="34" charset="0"/>
-                <a:cs typeface="Times New Roman" panose="02020603050405020304" pitchFamily="18" charset="0"/>
-              </a:rPr>
-              <a:t>N l</a:t>
-            </a:r>
-            <a:r>
-              <a:rPr lang="en-US" dirty="0">
-                <a:effectLst/>
-                <a:latin typeface="Times New Roman" panose="02020603050405020304" pitchFamily="18" charset="0"/>
-                <a:ea typeface="Calibri" panose="020F0502020204030204" pitchFamily="34" charset="0"/>
-                <a:cs typeface="Times New Roman" panose="02020603050405020304" pitchFamily="18" charset="0"/>
-              </a:rPr>
-              <a:t>og N</a:t>
-            </a:r>
-            <a:r>
-              <a:rPr lang="en-US" dirty="0">
-                <a:latin typeface="Times New Roman" panose="02020603050405020304" pitchFamily="18" charset="0"/>
-                <a:ea typeface="Calibri" panose="020F0502020204030204" pitchFamily="34" charset="0"/>
-                <a:cs typeface="Times New Roman" panose="02020603050405020304" pitchFamily="18" charset="0"/>
-              </a:rPr>
-              <a:t> </a:t>
-            </a:r>
-            <a:r>
-              <a:rPr lang="en-US" dirty="0">
-                <a:effectLst/>
-                <a:latin typeface="Times New Roman" panose="02020603050405020304" pitchFamily="18" charset="0"/>
-                <a:ea typeface="Calibri" panose="020F0502020204030204" pitchFamily="34" charset="0"/>
-                <a:cs typeface="Times New Roman" panose="02020603050405020304" pitchFamily="18" charset="0"/>
-              </a:rPr>
-              <a:t>).  </a:t>
-            </a:r>
-          </a:p>
-          <a:p>
-            <a:pPr lvl="1" algn="just">
-              <a:lnSpc>
-                <a:spcPct val="100000"/>
-              </a:lnSpc>
-              <a:spcAft>
-                <a:spcPts val="1000"/>
-              </a:spcAft>
-            </a:pPr>
-            <a:r>
-              <a:rPr lang="en-US" dirty="0">
-                <a:effectLst/>
-                <a:latin typeface="Times New Roman" panose="02020603050405020304" pitchFamily="18" charset="0"/>
-                <a:ea typeface="Calibri" panose="020F0502020204030204" pitchFamily="34" charset="0"/>
-                <a:cs typeface="Times New Roman" panose="02020603050405020304" pitchFamily="18" charset="0"/>
-              </a:rPr>
-              <a:t>There after there would be an insert operation only for every new arrival as it involves adding another departure event for the new arrival so </a:t>
-            </a:r>
-            <a:r>
-              <a:rPr lang="en-US">
-                <a:effectLst/>
-                <a:latin typeface="Times New Roman" panose="02020603050405020304" pitchFamily="18" charset="0"/>
-                <a:ea typeface="Calibri" panose="020F0502020204030204" pitchFamily="34" charset="0"/>
-                <a:cs typeface="Times New Roman" panose="02020603050405020304" pitchFamily="18" charset="0"/>
-              </a:rPr>
-              <a:t>that would be O(log N)</a:t>
-            </a:r>
-            <a:endParaRPr lang="en-IN" dirty="0">
-              <a:effectLst/>
-              <a:latin typeface="Calibri" panose="020F0502020204030204" pitchFamily="34" charset="0"/>
-              <a:ea typeface="Calibri" panose="020F0502020204030204" pitchFamily="34" charset="0"/>
-              <a:cs typeface="Times New Roman" panose="02020603050405020304" pitchFamily="18" charset="0"/>
-            </a:endParaRPr>
-          </a:p>
-          <a:p>
-            <a:pPr algn="just">
-              <a:lnSpc>
-                <a:spcPct val="100000"/>
-              </a:lnSpc>
-              <a:spcAft>
-                <a:spcPts val="1000"/>
-              </a:spcAft>
-            </a:pPr>
-            <a:r>
-              <a:rPr lang="en-US" sz="1800" dirty="0">
-                <a:effectLst/>
-                <a:latin typeface="Times New Roman" panose="02020603050405020304" pitchFamily="18" charset="0"/>
-                <a:ea typeface="Calibri" panose="020F0502020204030204" pitchFamily="34" charset="0"/>
-                <a:cs typeface="Times New Roman" panose="02020603050405020304" pitchFamily="18" charset="0"/>
-              </a:rPr>
-              <a:t>The </a:t>
-            </a:r>
-            <a:r>
-              <a:rPr lang="en-US" sz="1800" dirty="0" err="1">
-                <a:effectLst/>
-                <a:latin typeface="Times New Roman" panose="02020603050405020304" pitchFamily="18" charset="0"/>
-                <a:ea typeface="Calibri" panose="020F0502020204030204" pitchFamily="34" charset="0"/>
-                <a:cs typeface="Times New Roman" panose="02020603050405020304" pitchFamily="18" charset="0"/>
-              </a:rPr>
-              <a:t>binaryHeap</a:t>
-            </a:r>
-            <a:r>
-              <a:rPr lang="en-US" sz="1800" dirty="0">
-                <a:effectLst/>
-                <a:latin typeface="Times New Roman" panose="02020603050405020304" pitchFamily="18" charset="0"/>
-                <a:ea typeface="Calibri" panose="020F0502020204030204" pitchFamily="34" charset="0"/>
-                <a:cs typeface="Times New Roman" panose="02020603050405020304" pitchFamily="18" charset="0"/>
-              </a:rPr>
-              <a:t>-order property organizes the data in a sorted order</a:t>
-            </a:r>
-          </a:p>
-          <a:p>
-            <a:pPr lvl="1" algn="just">
-              <a:lnSpc>
-                <a:spcPct val="100000"/>
-              </a:lnSpc>
-              <a:spcAft>
-                <a:spcPts val="1000"/>
-              </a:spcAft>
-            </a:pPr>
-            <a:r>
-              <a:rPr lang="en-US" dirty="0">
-                <a:effectLst/>
-                <a:latin typeface="Times New Roman" panose="02020603050405020304" pitchFamily="18" charset="0"/>
-                <a:ea typeface="Calibri" panose="020F0502020204030204" pitchFamily="34" charset="0"/>
-                <a:cs typeface="Times New Roman" panose="02020603050405020304" pitchFamily="18" charset="0"/>
-              </a:rPr>
-              <a:t> places the smallest or earliest event at the root of the heap, i.e. arranges the events  as they occur in chronological order of time of the day.</a:t>
-            </a:r>
-          </a:p>
-          <a:p>
-            <a:pPr lvl="1" algn="just">
-              <a:lnSpc>
-                <a:spcPct val="100000"/>
-              </a:lnSpc>
-              <a:spcAft>
-                <a:spcPts val="1000"/>
-              </a:spcAft>
-            </a:pPr>
-            <a:r>
-              <a:rPr lang="en-US" dirty="0">
-                <a:effectLst/>
-                <a:latin typeface="Times New Roman" panose="02020603050405020304" pitchFamily="18" charset="0"/>
-                <a:ea typeface="Calibri" panose="020F0502020204030204" pitchFamily="34" charset="0"/>
-                <a:cs typeface="Times New Roman" panose="02020603050405020304" pitchFamily="18" charset="0"/>
-              </a:rPr>
-              <a:t>finding the minimum just takes O(1) and there by contributes to the efficiency. </a:t>
-            </a:r>
-            <a:endParaRPr lang="en-IN" dirty="0">
-              <a:effectLst/>
-              <a:latin typeface="Calibri" panose="020F0502020204030204" pitchFamily="34" charset="0"/>
-              <a:ea typeface="Calibri" panose="020F0502020204030204" pitchFamily="34" charset="0"/>
-              <a:cs typeface="Times New Roman" panose="02020603050405020304" pitchFamily="18" charset="0"/>
-            </a:endParaRPr>
-          </a:p>
-          <a:p>
-            <a:pPr algn="just">
-              <a:lnSpc>
-                <a:spcPct val="100000"/>
-              </a:lnSpc>
-              <a:spcAft>
-                <a:spcPts val="1000"/>
-              </a:spcAft>
-            </a:pPr>
-            <a:r>
-              <a:rPr lang="en-US" sz="1800" dirty="0">
-                <a:effectLst/>
-                <a:latin typeface="Times New Roman" panose="02020603050405020304" pitchFamily="18" charset="0"/>
-                <a:ea typeface="Calibri" panose="020F0502020204030204" pitchFamily="34" charset="0"/>
-                <a:cs typeface="Times New Roman" panose="02020603050405020304" pitchFamily="18" charset="0"/>
-              </a:rPr>
-              <a:t>The stack operations to push or pop a gate number into the Gates stack object involves O(1) time complexity.</a:t>
-            </a:r>
-            <a:endParaRPr lang="en-IN" sz="1800" dirty="0">
-              <a:effectLst/>
-              <a:latin typeface="Calibri" panose="020F0502020204030204" pitchFamily="34" charset="0"/>
-              <a:ea typeface="Calibri" panose="020F0502020204030204" pitchFamily="34" charset="0"/>
-              <a:cs typeface="Times New Roman" panose="02020603050405020304" pitchFamily="18" charset="0"/>
-            </a:endParaRPr>
-          </a:p>
-          <a:p>
-            <a:pPr marL="457200" lvl="1" indent="-228600" algn="l" rtl="0">
-              <a:lnSpc>
-                <a:spcPct val="100000"/>
-              </a:lnSpc>
-              <a:spcBef>
-                <a:spcPts val="0"/>
-              </a:spcBef>
-              <a:spcAft>
-                <a:spcPts val="0"/>
-              </a:spcAft>
-              <a:buSzPts val="1395"/>
-              <a:buFont typeface="Open Sans"/>
-              <a:buNone/>
-            </a:pPr>
-            <a:endParaRPr sz="1462" dirty="0">
-              <a:latin typeface="Times New Roman"/>
-              <a:ea typeface="Times New Roman"/>
-              <a:cs typeface="Times New Roman"/>
-              <a:sym typeface="Times New Roman"/>
-            </a:endParaRPr>
-          </a:p>
-          <a:p>
-            <a:pPr marL="596900" lvl="1" indent="0" algn="l" rtl="0">
-              <a:lnSpc>
-                <a:spcPct val="100000"/>
-              </a:lnSpc>
-              <a:spcBef>
-                <a:spcPts val="0"/>
-              </a:spcBef>
-              <a:spcAft>
-                <a:spcPts val="0"/>
-              </a:spcAft>
-              <a:buSzPts val="1085"/>
-              <a:buNone/>
-            </a:pPr>
-            <a:endParaRPr sz="1385" dirty="0">
-              <a:latin typeface="Times New Roman"/>
-              <a:ea typeface="Times New Roman"/>
-              <a:cs typeface="Times New Roman"/>
-              <a:sym typeface="Times New Roman"/>
-            </a:endParaRPr>
-          </a:p>
-          <a:p>
-            <a:pPr marL="596900" lvl="1" indent="0" algn="l" rtl="0">
-              <a:lnSpc>
-                <a:spcPct val="95000"/>
-              </a:lnSpc>
-              <a:spcBef>
-                <a:spcPts val="0"/>
-              </a:spcBef>
-              <a:spcAft>
-                <a:spcPts val="0"/>
-              </a:spcAft>
-              <a:buSzPts val="1085"/>
-              <a:buNone/>
-            </a:pPr>
-            <a:endParaRPr sz="1385" dirty="0">
-              <a:latin typeface="Times New Roman"/>
-              <a:ea typeface="Times New Roman"/>
-              <a:cs typeface="Times New Roman"/>
-              <a:sym typeface="Times New Roman"/>
-            </a:endParaRPr>
-          </a:p>
-        </p:txBody>
-      </p:sp>
     </p:spTree>
     <p:extLst>
       <p:ext uri="{BB962C8B-B14F-4D97-AF65-F5344CB8AC3E}">
-        <p14:creationId xmlns:p14="http://schemas.microsoft.com/office/powerpoint/2010/main" val="1966081845"/>
+        <p14:creationId xmlns:p14="http://schemas.microsoft.com/office/powerpoint/2010/main" val="773285560"/>
       </p:ext>
     </p:extLst>
   </p:cSld>
@@ -10140,7 +9716,7 @@
                 <a:latin typeface="Times New Roman" panose="02020603050405020304" pitchFamily="18" charset="0"/>
                 <a:cs typeface="Times New Roman" panose="02020603050405020304" pitchFamily="18" charset="0"/>
               </a:rPr>
-              <a:t>   Results analysis and conclusions drawn</a:t>
+              <a:t>   Program performance analysis</a:t>
             </a:r>
             <a:endParaRPr sz="2400" dirty="0">
               <a:latin typeface="Times New Roman" panose="02020603050405020304" pitchFamily="18" charset="0"/>
@@ -10178,6 +9754,451 @@
           </a:bodyPr>
           <a:lstStyle/>
           <a:p>
+            <a:pPr algn="just">
+              <a:lnSpc>
+                <a:spcPct val="100000"/>
+              </a:lnSpc>
+              <a:spcAft>
+                <a:spcPts val="1000"/>
+              </a:spcAft>
+            </a:pPr>
+            <a:r>
+              <a:rPr lang="en-US" sz="1800" dirty="0">
+                <a:effectLst/>
+                <a:latin typeface="Times New Roman" panose="02020603050405020304" pitchFamily="18" charset="0"/>
+                <a:ea typeface="Calibri" panose="020F0502020204030204" pitchFamily="34" charset="0"/>
+                <a:cs typeface="Times New Roman" panose="02020603050405020304" pitchFamily="18" charset="0"/>
+              </a:rPr>
+              <a:t>The initial construction of heap tree object is done with N items (N arrivals) using the </a:t>
+            </a:r>
+            <a:r>
+              <a:rPr lang="en-US" sz="1800" b="1" dirty="0" err="1">
+                <a:effectLst/>
+                <a:latin typeface="Times New Roman" panose="02020603050405020304" pitchFamily="18" charset="0"/>
+                <a:ea typeface="Calibri" panose="020F0502020204030204" pitchFamily="34" charset="0"/>
+                <a:cs typeface="Times New Roman" panose="02020603050405020304" pitchFamily="18" charset="0"/>
+              </a:rPr>
+              <a:t>buildheap</a:t>
+            </a:r>
+            <a:r>
+              <a:rPr lang="en-US" sz="1800" b="1" dirty="0">
+                <a:effectLst/>
+                <a:latin typeface="Times New Roman" panose="02020603050405020304" pitchFamily="18" charset="0"/>
+                <a:ea typeface="Calibri" panose="020F0502020204030204" pitchFamily="34" charset="0"/>
+                <a:cs typeface="Times New Roman" panose="02020603050405020304" pitchFamily="18" charset="0"/>
+              </a:rPr>
+              <a:t> function call </a:t>
+            </a:r>
+            <a:r>
+              <a:rPr lang="en-US" sz="1800" dirty="0">
+                <a:effectLst/>
+                <a:latin typeface="Times New Roman" panose="02020603050405020304" pitchFamily="18" charset="0"/>
+                <a:ea typeface="Calibri" panose="020F0502020204030204" pitchFamily="34" charset="0"/>
+                <a:cs typeface="Times New Roman" panose="02020603050405020304" pitchFamily="18" charset="0"/>
+              </a:rPr>
+              <a:t>from within the parameter constructor of the </a:t>
+            </a:r>
+            <a:r>
+              <a:rPr lang="en-US" sz="1800" dirty="0" err="1">
+                <a:effectLst/>
+                <a:latin typeface="Times New Roman" panose="02020603050405020304" pitchFamily="18" charset="0"/>
+                <a:ea typeface="Calibri" panose="020F0502020204030204" pitchFamily="34" charset="0"/>
+                <a:cs typeface="Times New Roman" panose="02020603050405020304" pitchFamily="18" charset="0"/>
+              </a:rPr>
+              <a:t>Binaryheap</a:t>
+            </a:r>
+            <a:r>
+              <a:rPr lang="en-US" sz="1800" dirty="0">
+                <a:effectLst/>
+                <a:latin typeface="Times New Roman" panose="02020603050405020304" pitchFamily="18" charset="0"/>
+                <a:ea typeface="Calibri" panose="020F0502020204030204" pitchFamily="34" charset="0"/>
+                <a:cs typeface="Times New Roman" panose="02020603050405020304" pitchFamily="18" charset="0"/>
+              </a:rPr>
+              <a:t> class.</a:t>
+            </a:r>
+          </a:p>
+          <a:p>
+            <a:pPr lvl="1" algn="just">
+              <a:lnSpc>
+                <a:spcPct val="100000"/>
+              </a:lnSpc>
+              <a:spcAft>
+                <a:spcPts val="1000"/>
+              </a:spcAft>
+            </a:pPr>
+            <a:r>
+              <a:rPr lang="en-US" dirty="0">
+                <a:effectLst/>
+                <a:latin typeface="Times New Roman" panose="02020603050405020304" pitchFamily="18" charset="0"/>
+                <a:ea typeface="Calibri" panose="020F0502020204030204" pitchFamily="34" charset="0"/>
+                <a:cs typeface="Times New Roman" panose="02020603050405020304" pitchFamily="18" charset="0"/>
+              </a:rPr>
+              <a:t>The order of this build heap is that of  Heap binary tre</a:t>
+            </a:r>
+            <a:r>
+              <a:rPr lang="en-US" dirty="0">
+                <a:latin typeface="Times New Roman" panose="02020603050405020304" pitchFamily="18" charset="0"/>
+                <a:ea typeface="Calibri" panose="020F0502020204030204" pitchFamily="34" charset="0"/>
+                <a:cs typeface="Times New Roman" panose="02020603050405020304" pitchFamily="18" charset="0"/>
+              </a:rPr>
+              <a:t>e insertion </a:t>
+            </a:r>
+            <a:r>
+              <a:rPr lang="en-US" dirty="0">
+                <a:effectLst/>
+                <a:latin typeface="Times New Roman" panose="02020603050405020304" pitchFamily="18" charset="0"/>
+                <a:ea typeface="Calibri" panose="020F0502020204030204" pitchFamily="34" charset="0"/>
+                <a:cs typeface="Times New Roman" panose="02020603050405020304" pitchFamily="18" charset="0"/>
+              </a:rPr>
+              <a:t>i.e. O (</a:t>
+            </a:r>
+            <a:r>
+              <a:rPr lang="en-US" dirty="0">
+                <a:latin typeface="Times New Roman" panose="02020603050405020304" pitchFamily="18" charset="0"/>
+                <a:ea typeface="Calibri" panose="020F0502020204030204" pitchFamily="34" charset="0"/>
+                <a:cs typeface="Times New Roman" panose="02020603050405020304" pitchFamily="18" charset="0"/>
+              </a:rPr>
+              <a:t>N l</a:t>
+            </a:r>
+            <a:r>
+              <a:rPr lang="en-US" dirty="0">
+                <a:effectLst/>
+                <a:latin typeface="Times New Roman" panose="02020603050405020304" pitchFamily="18" charset="0"/>
+                <a:ea typeface="Calibri" panose="020F0502020204030204" pitchFamily="34" charset="0"/>
+                <a:cs typeface="Times New Roman" panose="02020603050405020304" pitchFamily="18" charset="0"/>
+              </a:rPr>
+              <a:t>og N</a:t>
+            </a:r>
+            <a:r>
+              <a:rPr lang="en-US" dirty="0">
+                <a:latin typeface="Times New Roman" panose="02020603050405020304" pitchFamily="18" charset="0"/>
+                <a:ea typeface="Calibri" panose="020F0502020204030204" pitchFamily="34" charset="0"/>
+                <a:cs typeface="Times New Roman" panose="02020603050405020304" pitchFamily="18" charset="0"/>
+              </a:rPr>
+              <a:t> </a:t>
+            </a:r>
+            <a:r>
+              <a:rPr lang="en-US" dirty="0">
+                <a:effectLst/>
+                <a:latin typeface="Times New Roman" panose="02020603050405020304" pitchFamily="18" charset="0"/>
+                <a:ea typeface="Calibri" panose="020F0502020204030204" pitchFamily="34" charset="0"/>
+                <a:cs typeface="Times New Roman" panose="02020603050405020304" pitchFamily="18" charset="0"/>
+              </a:rPr>
+              <a:t>).  </a:t>
+            </a:r>
+          </a:p>
+          <a:p>
+            <a:pPr lvl="1" algn="just">
+              <a:lnSpc>
+                <a:spcPct val="100000"/>
+              </a:lnSpc>
+              <a:spcAft>
+                <a:spcPts val="1000"/>
+              </a:spcAft>
+            </a:pPr>
+            <a:r>
+              <a:rPr lang="en-US" dirty="0">
+                <a:effectLst/>
+                <a:latin typeface="Times New Roman" panose="02020603050405020304" pitchFamily="18" charset="0"/>
+                <a:ea typeface="Calibri" panose="020F0502020204030204" pitchFamily="34" charset="0"/>
+                <a:cs typeface="Times New Roman" panose="02020603050405020304" pitchFamily="18" charset="0"/>
+              </a:rPr>
+              <a:t>There after there would be an insert operation only for every new arrival as it involves adding another departure event for the new arrival so that would be O(log N)</a:t>
+            </a:r>
+            <a:endParaRPr lang="en-IN" dirty="0">
+              <a:effectLst/>
+              <a:latin typeface="Calibri" panose="020F0502020204030204" pitchFamily="34" charset="0"/>
+              <a:ea typeface="Calibri" panose="020F0502020204030204" pitchFamily="34" charset="0"/>
+              <a:cs typeface="Times New Roman" panose="02020603050405020304" pitchFamily="18" charset="0"/>
+            </a:endParaRPr>
+          </a:p>
+          <a:p>
+            <a:pPr algn="just">
+              <a:lnSpc>
+                <a:spcPct val="100000"/>
+              </a:lnSpc>
+              <a:spcAft>
+                <a:spcPts val="1000"/>
+              </a:spcAft>
+            </a:pPr>
+            <a:r>
+              <a:rPr lang="en-US" sz="1800" dirty="0">
+                <a:effectLst/>
+                <a:latin typeface="Times New Roman" panose="02020603050405020304" pitchFamily="18" charset="0"/>
+                <a:ea typeface="Calibri" panose="020F0502020204030204" pitchFamily="34" charset="0"/>
+                <a:cs typeface="Times New Roman" panose="02020603050405020304" pitchFamily="18" charset="0"/>
+              </a:rPr>
+              <a:t>The </a:t>
+            </a:r>
+            <a:r>
+              <a:rPr lang="en-US" sz="1800" dirty="0" err="1">
+                <a:effectLst/>
+                <a:latin typeface="Times New Roman" panose="02020603050405020304" pitchFamily="18" charset="0"/>
+                <a:ea typeface="Calibri" panose="020F0502020204030204" pitchFamily="34" charset="0"/>
+                <a:cs typeface="Times New Roman" panose="02020603050405020304" pitchFamily="18" charset="0"/>
+              </a:rPr>
+              <a:t>binaryHeap</a:t>
+            </a:r>
+            <a:r>
+              <a:rPr lang="en-US" sz="1800" dirty="0">
+                <a:effectLst/>
+                <a:latin typeface="Times New Roman" panose="02020603050405020304" pitchFamily="18" charset="0"/>
+                <a:ea typeface="Calibri" panose="020F0502020204030204" pitchFamily="34" charset="0"/>
+                <a:cs typeface="Times New Roman" panose="02020603050405020304" pitchFamily="18" charset="0"/>
+              </a:rPr>
+              <a:t>-order property organizes the data in a sorted order</a:t>
+            </a:r>
+          </a:p>
+          <a:p>
+            <a:pPr lvl="1" algn="just">
+              <a:lnSpc>
+                <a:spcPct val="100000"/>
+              </a:lnSpc>
+              <a:spcAft>
+                <a:spcPts val="1000"/>
+              </a:spcAft>
+            </a:pPr>
+            <a:r>
+              <a:rPr lang="en-US" dirty="0">
+                <a:effectLst/>
+                <a:latin typeface="Times New Roman" panose="02020603050405020304" pitchFamily="18" charset="0"/>
+                <a:ea typeface="Calibri" panose="020F0502020204030204" pitchFamily="34" charset="0"/>
+                <a:cs typeface="Times New Roman" panose="02020603050405020304" pitchFamily="18" charset="0"/>
+              </a:rPr>
+              <a:t> places the smallest or earliest event at the root of the heap, i.e. arranges the events  as they occur in chronological order of time of the day.</a:t>
+            </a:r>
+          </a:p>
+          <a:p>
+            <a:pPr lvl="1" algn="just">
+              <a:lnSpc>
+                <a:spcPct val="100000"/>
+              </a:lnSpc>
+              <a:spcAft>
+                <a:spcPts val="1000"/>
+              </a:spcAft>
+            </a:pPr>
+            <a:r>
+              <a:rPr lang="en-US" dirty="0">
+                <a:effectLst/>
+                <a:latin typeface="Times New Roman" panose="02020603050405020304" pitchFamily="18" charset="0"/>
+                <a:ea typeface="Calibri" panose="020F0502020204030204" pitchFamily="34" charset="0"/>
+                <a:cs typeface="Times New Roman" panose="02020603050405020304" pitchFamily="18" charset="0"/>
+              </a:rPr>
+              <a:t>finding the minimum just takes O(1) and there by contributes to the efficiency. </a:t>
+            </a:r>
+            <a:endParaRPr lang="en-IN" dirty="0">
+              <a:effectLst/>
+              <a:latin typeface="Calibri" panose="020F0502020204030204" pitchFamily="34" charset="0"/>
+              <a:ea typeface="Calibri" panose="020F0502020204030204" pitchFamily="34" charset="0"/>
+              <a:cs typeface="Times New Roman" panose="02020603050405020304" pitchFamily="18" charset="0"/>
+            </a:endParaRPr>
+          </a:p>
+          <a:p>
+            <a:pPr algn="just">
+              <a:lnSpc>
+                <a:spcPct val="100000"/>
+              </a:lnSpc>
+              <a:spcAft>
+                <a:spcPts val="1000"/>
+              </a:spcAft>
+            </a:pPr>
+            <a:r>
+              <a:rPr lang="en-US" sz="1800" dirty="0">
+                <a:effectLst/>
+                <a:latin typeface="Times New Roman" panose="02020603050405020304" pitchFamily="18" charset="0"/>
+                <a:ea typeface="Calibri" panose="020F0502020204030204" pitchFamily="34" charset="0"/>
+                <a:cs typeface="Times New Roman" panose="02020603050405020304" pitchFamily="18" charset="0"/>
+              </a:rPr>
+              <a:t>The stack operations to push or pop a gate number into the Gates stack object involves O(1) time complexity.</a:t>
+            </a:r>
+            <a:endParaRPr lang="en-IN" sz="1800" dirty="0">
+              <a:effectLst/>
+              <a:latin typeface="Calibri" panose="020F0502020204030204" pitchFamily="34" charset="0"/>
+              <a:ea typeface="Calibri" panose="020F0502020204030204" pitchFamily="34" charset="0"/>
+              <a:cs typeface="Times New Roman" panose="02020603050405020304" pitchFamily="18" charset="0"/>
+            </a:endParaRPr>
+          </a:p>
+          <a:p>
+            <a:pPr marL="457200" lvl="1" indent="-228600" algn="l" rtl="0">
+              <a:lnSpc>
+                <a:spcPct val="100000"/>
+              </a:lnSpc>
+              <a:spcBef>
+                <a:spcPts val="0"/>
+              </a:spcBef>
+              <a:spcAft>
+                <a:spcPts val="0"/>
+              </a:spcAft>
+              <a:buSzPts val="1395"/>
+              <a:buFont typeface="Open Sans"/>
+              <a:buNone/>
+            </a:pPr>
+            <a:endParaRPr sz="1462" dirty="0">
+              <a:latin typeface="Times New Roman"/>
+              <a:ea typeface="Times New Roman"/>
+              <a:cs typeface="Times New Roman"/>
+              <a:sym typeface="Times New Roman"/>
+            </a:endParaRPr>
+          </a:p>
+          <a:p>
+            <a:pPr marL="596900" lvl="1" indent="0" algn="l" rtl="0">
+              <a:lnSpc>
+                <a:spcPct val="100000"/>
+              </a:lnSpc>
+              <a:spcBef>
+                <a:spcPts val="0"/>
+              </a:spcBef>
+              <a:spcAft>
+                <a:spcPts val="0"/>
+              </a:spcAft>
+              <a:buSzPts val="1085"/>
+              <a:buNone/>
+            </a:pPr>
+            <a:endParaRPr sz="1385" dirty="0">
+              <a:latin typeface="Times New Roman"/>
+              <a:ea typeface="Times New Roman"/>
+              <a:cs typeface="Times New Roman"/>
+              <a:sym typeface="Times New Roman"/>
+            </a:endParaRPr>
+          </a:p>
+          <a:p>
+            <a:pPr marL="596900" lvl="1" indent="0" algn="l" rtl="0">
+              <a:lnSpc>
+                <a:spcPct val="95000"/>
+              </a:lnSpc>
+              <a:spcBef>
+                <a:spcPts val="0"/>
+              </a:spcBef>
+              <a:spcAft>
+                <a:spcPts val="0"/>
+              </a:spcAft>
+              <a:buSzPts val="1085"/>
+              <a:buNone/>
+            </a:pPr>
+            <a:endParaRPr sz="1385" dirty="0">
+              <a:latin typeface="Times New Roman"/>
+              <a:ea typeface="Times New Roman"/>
+              <a:cs typeface="Times New Roman"/>
+              <a:sym typeface="Times New Roman"/>
+            </a:endParaRPr>
+          </a:p>
+        </p:txBody>
+      </p:sp>
+    </p:spTree>
+    <p:extLst>
+      <p:ext uri="{BB962C8B-B14F-4D97-AF65-F5344CB8AC3E}">
+        <p14:creationId xmlns:p14="http://schemas.microsoft.com/office/powerpoint/2010/main" val="1966081845"/>
+      </p:ext>
+    </p:extLst>
+  </p:cSld>
+  <p:clrMapOvr>
+    <a:masterClrMapping/>
+  </p:clrMapOvr>
+</p:sld>
+</file>
+
+<file path=ppt/slides/slide16.xml><?xml version="1.0" encoding="utf-8"?>
+<p:sld xmlns:a="http://schemas.openxmlformats.org/drawingml/2006/main" xmlns:r="http://schemas.openxmlformats.org/officeDocument/2006/relationships" xmlns:p="http://schemas.openxmlformats.org/presentationml/2006/main">
+  <p:cSld>
+    <p:spTree>
+      <p:nvGrpSpPr>
+        <p:cNvPr id="1" name="Shape 95"/>
+        <p:cNvGrpSpPr/>
+        <p:nvPr/>
+      </p:nvGrpSpPr>
+      <p:grpSpPr>
+        <a:xfrm>
+          <a:off x="0" y="0"/>
+          <a:ext cx="0" cy="0"/>
+          <a:chOff x="0" y="0"/>
+          <a:chExt cx="0" cy="0"/>
+        </a:xfrm>
+      </p:grpSpPr>
+      <p:sp>
+        <p:nvSpPr>
+          <p:cNvPr id="96" name="Google Shape;96;g29a6ab1d9b3_0_49"/>
+          <p:cNvSpPr txBox="1">
+            <a:spLocks noGrp="1"/>
+          </p:cNvSpPr>
+          <p:nvPr>
+            <p:ph type="title"/>
+          </p:nvPr>
+        </p:nvSpPr>
+        <p:spPr>
+          <a:xfrm>
+            <a:off x="438615" y="125000"/>
+            <a:ext cx="7914554" cy="707400"/>
+          </a:xfrm>
+          <a:prstGeom prst="rect">
+            <a:avLst/>
+          </a:prstGeom>
+          <a:noFill/>
+          <a:ln>
+            <a:noFill/>
+          </a:ln>
+        </p:spPr>
+        <p:txBody>
+          <a:bodyPr spcFirstLastPara="1" wrap="square" lIns="91425" tIns="91425" rIns="91425" bIns="91425" anchor="t" anchorCtr="0">
+            <a:normAutofit/>
+          </a:bodyPr>
+          <a:lstStyle/>
+          <a:p>
+            <a:pPr marL="0" lvl="0" indent="0" rtl="0">
+              <a:lnSpc>
+                <a:spcPct val="100000"/>
+              </a:lnSpc>
+              <a:spcBef>
+                <a:spcPts val="0"/>
+              </a:spcBef>
+              <a:spcAft>
+                <a:spcPts val="0"/>
+              </a:spcAft>
+              <a:buSzPct val="219512"/>
+              <a:buNone/>
+            </a:pPr>
+            <a:r>
+              <a:rPr lang="en" sz="2400" dirty="0">
+                <a:latin typeface="Times New Roman" panose="02020603050405020304" pitchFamily="18" charset="0"/>
+                <a:cs typeface="Times New Roman" panose="02020603050405020304" pitchFamily="18" charset="0"/>
+              </a:rPr>
+              <a:t>   Results analysis and conclusions drawn</a:t>
+            </a:r>
+            <a:endParaRPr sz="2400" dirty="0">
+              <a:latin typeface="Times New Roman" panose="02020603050405020304" pitchFamily="18" charset="0"/>
+              <a:cs typeface="Times New Roman" panose="02020603050405020304" pitchFamily="18" charset="0"/>
+            </a:endParaRPr>
+          </a:p>
+        </p:txBody>
+      </p:sp>
+      <p:sp>
+        <p:nvSpPr>
+          <p:cNvPr id="97" name="Google Shape;97;g29a6ab1d9b3_0_49"/>
+          <p:cNvSpPr txBox="1">
+            <a:spLocks noGrp="1"/>
+          </p:cNvSpPr>
+          <p:nvPr>
+            <p:ph type="body" idx="1"/>
+          </p:nvPr>
+        </p:nvSpPr>
+        <p:spPr>
+          <a:xfrm>
+            <a:off x="125312" y="832400"/>
+            <a:ext cx="8520600" cy="3932888"/>
+          </a:xfrm>
+          <a:prstGeom prst="rect">
+            <a:avLst/>
+          </a:prstGeom>
+          <a:noFill/>
+          <a:ln>
+            <a:noFill/>
+          </a:ln>
+        </p:spPr>
+        <p:txBody>
+          <a:bodyPr spcFirstLastPara="1" wrap="square" lIns="91425" tIns="91425" rIns="91425" bIns="91425" anchor="t" anchorCtr="0">
+            <a:noAutofit/>
+          </a:bodyPr>
+          <a:lstStyle/>
+          <a:p>
             <a:pPr marL="114300" indent="0" algn="just">
               <a:lnSpc>
                 <a:spcPct val="100000"/>
@@ -10414,7 +10435,7 @@
 </p:sld>
 </file>
 
-<file path=ppt/slides/slide16.xml><?xml version="1.0" encoding="utf-8"?>
+<file path=ppt/slides/slide17.xml><?xml version="1.0" encoding="utf-8"?>
 <p:sld xmlns:a="http://schemas.openxmlformats.org/drawingml/2006/main" xmlns:r="http://schemas.openxmlformats.org/officeDocument/2006/relationships" xmlns:p="http://schemas.openxmlformats.org/presentationml/2006/main">
   <p:cSld>
     <p:spTree>

</xml_diff>